<commit_message>
Cập nhật báo cáo, gần xong các sơ đồ cho QLTS,...
Còn thiếu Sequences cho QLTS.
Các sơ đồ class nằm trong các file PPT
Các sơ đồ vật lý nằm trong hình PNG

*Trình bày lại danh sách các bảng, sơ đồ, tài liệu tham khảo, và một vài
chỗ nhỏ chưa viết

DONE 90%
</commit_message>
<xml_diff>
--- a/_BaoCao/quocdunginfo/Class Hieararchy Diagram.pptx
+++ b/_BaoCao/quocdunginfo/Class Hieararchy Diagram.pptx
@@ -255,7 +255,7 @@
           <a:p>
             <a:fld id="{07ED667D-834B-4A53-A4F7-24BA605DDA1B}" type="datetimeFigureOut">
               <a:rPr lang="en-US" smtClean="0"/>
-              <a:t>10/7/2014</a:t>
+              <a:t>27/10/2014</a:t>
             </a:fld>
             <a:endParaRPr lang="en-US"/>
           </a:p>
@@ -425,7 +425,7 @@
           <a:p>
             <a:fld id="{07ED667D-834B-4A53-A4F7-24BA605DDA1B}" type="datetimeFigureOut">
               <a:rPr lang="en-US" smtClean="0"/>
-              <a:t>10/7/2014</a:t>
+              <a:t>27/10/2014</a:t>
             </a:fld>
             <a:endParaRPr lang="en-US"/>
           </a:p>
@@ -605,7 +605,7 @@
           <a:p>
             <a:fld id="{07ED667D-834B-4A53-A4F7-24BA605DDA1B}" type="datetimeFigureOut">
               <a:rPr lang="en-US" smtClean="0"/>
-              <a:t>10/7/2014</a:t>
+              <a:t>27/10/2014</a:t>
             </a:fld>
             <a:endParaRPr lang="en-US"/>
           </a:p>
@@ -775,7 +775,7 @@
           <a:p>
             <a:fld id="{07ED667D-834B-4A53-A4F7-24BA605DDA1B}" type="datetimeFigureOut">
               <a:rPr lang="en-US" smtClean="0"/>
-              <a:t>10/7/2014</a:t>
+              <a:t>27/10/2014</a:t>
             </a:fld>
             <a:endParaRPr lang="en-US"/>
           </a:p>
@@ -1019,7 +1019,7 @@
           <a:p>
             <a:fld id="{07ED667D-834B-4A53-A4F7-24BA605DDA1B}" type="datetimeFigureOut">
               <a:rPr lang="en-US" smtClean="0"/>
-              <a:t>10/7/2014</a:t>
+              <a:t>27/10/2014</a:t>
             </a:fld>
             <a:endParaRPr lang="en-US"/>
           </a:p>
@@ -1251,7 +1251,7 @@
           <a:p>
             <a:fld id="{07ED667D-834B-4A53-A4F7-24BA605DDA1B}" type="datetimeFigureOut">
               <a:rPr lang="en-US" smtClean="0"/>
-              <a:t>10/7/2014</a:t>
+              <a:t>27/10/2014</a:t>
             </a:fld>
             <a:endParaRPr lang="en-US"/>
           </a:p>
@@ -1618,7 +1618,7 @@
           <a:p>
             <a:fld id="{07ED667D-834B-4A53-A4F7-24BA605DDA1B}" type="datetimeFigureOut">
               <a:rPr lang="en-US" smtClean="0"/>
-              <a:t>10/7/2014</a:t>
+              <a:t>27/10/2014</a:t>
             </a:fld>
             <a:endParaRPr lang="en-US"/>
           </a:p>
@@ -1736,7 +1736,7 @@
           <a:p>
             <a:fld id="{07ED667D-834B-4A53-A4F7-24BA605DDA1B}" type="datetimeFigureOut">
               <a:rPr lang="en-US" smtClean="0"/>
-              <a:t>10/7/2014</a:t>
+              <a:t>27/10/2014</a:t>
             </a:fld>
             <a:endParaRPr lang="en-US"/>
           </a:p>
@@ -1831,7 +1831,7 @@
           <a:p>
             <a:fld id="{07ED667D-834B-4A53-A4F7-24BA605DDA1B}" type="datetimeFigureOut">
               <a:rPr lang="en-US" smtClean="0"/>
-              <a:t>10/7/2014</a:t>
+              <a:t>27/10/2014</a:t>
             </a:fld>
             <a:endParaRPr lang="en-US"/>
           </a:p>
@@ -2108,7 +2108,7 @@
           <a:p>
             <a:fld id="{07ED667D-834B-4A53-A4F7-24BA605DDA1B}" type="datetimeFigureOut">
               <a:rPr lang="en-US" smtClean="0"/>
-              <a:t>10/7/2014</a:t>
+              <a:t>27/10/2014</a:t>
             </a:fld>
             <a:endParaRPr lang="en-US"/>
           </a:p>
@@ -2365,7 +2365,7 @@
           <a:p>
             <a:fld id="{07ED667D-834B-4A53-A4F7-24BA605DDA1B}" type="datetimeFigureOut">
               <a:rPr lang="en-US" smtClean="0"/>
-              <a:t>10/7/2014</a:t>
+              <a:t>27/10/2014</a:t>
             </a:fld>
             <a:endParaRPr lang="en-US"/>
           </a:p>
@@ -2578,7 +2578,7 @@
           <a:p>
             <a:fld id="{07ED667D-834B-4A53-A4F7-24BA605DDA1B}" type="datetimeFigureOut">
               <a:rPr lang="en-US" smtClean="0"/>
-              <a:t>10/7/2014</a:t>
+              <a:t>27/10/2014</a:t>
             </a:fld>
             <a:endParaRPr lang="en-US"/>
           </a:p>
@@ -4658,9 +4658,9 @@
         <p:grpSpPr>
           <a:xfrm>
             <a:off x="1648276" y="2078524"/>
-            <a:ext cx="2829525" cy="3220427"/>
+            <a:ext cx="2829525" cy="3551715"/>
             <a:chOff x="1648276" y="1230799"/>
-            <a:chExt cx="2829525" cy="3220427"/>
+            <a:chExt cx="2829525" cy="3551715"/>
           </a:xfrm>
         </p:grpSpPr>
         <p:grpSp>
@@ -4672,9 +4672,9 @@
           <p:grpSpPr>
             <a:xfrm>
               <a:off x="2991811" y="1230799"/>
-              <a:ext cx="161925" cy="3220427"/>
+              <a:ext cx="161925" cy="3550946"/>
               <a:chOff x="2991811" y="1230799"/>
-              <a:chExt cx="161925" cy="3220427"/>
+              <a:chExt cx="161925" cy="3550946"/>
             </a:xfrm>
             <a:solidFill>
               <a:schemeClr val="bg1"/>
@@ -4687,9 +4687,9 @@
               <p:nvPr/>
             </p:nvCxnSpPr>
             <p:spPr>
-              <a:xfrm>
-                <a:off x="3073380" y="1310916"/>
-                <a:ext cx="0" cy="3140310"/>
+              <a:xfrm flipH="1">
+                <a:off x="3072773" y="1310916"/>
+                <a:ext cx="607" cy="3470829"/>
               </a:xfrm>
               <a:prstGeom prst="line">
                 <a:avLst/>
@@ -5078,6 +5078,41 @@
             </a:fontRef>
           </p:style>
         </p:cxnSp>
+        <p:cxnSp>
+          <p:nvCxnSpPr>
+            <p:cNvPr id="60" name="Straight Connector 59"/>
+            <p:cNvCxnSpPr/>
+            <p:nvPr/>
+          </p:nvCxnSpPr>
+          <p:spPr>
+            <a:xfrm>
+              <a:off x="1679027" y="4781745"/>
+              <a:ext cx="2798774" cy="769"/>
+            </a:xfrm>
+            <a:prstGeom prst="line">
+              <a:avLst/>
+            </a:prstGeom>
+            <a:ln w="12700">
+              <a:solidFill>
+                <a:schemeClr val="tx1"/>
+              </a:solidFill>
+            </a:ln>
+          </p:spPr>
+          <p:style>
+            <a:lnRef idx="1">
+              <a:schemeClr val="accent1"/>
+            </a:lnRef>
+            <a:fillRef idx="0">
+              <a:schemeClr val="accent1"/>
+            </a:fillRef>
+            <a:effectRef idx="0">
+              <a:schemeClr val="accent1"/>
+            </a:effectRef>
+            <a:fontRef idx="minor">
+              <a:schemeClr val="tx1"/>
+            </a:fontRef>
+          </p:style>
+        </p:cxnSp>
       </p:grpSp>
       <p:cxnSp>
         <p:nvCxnSpPr>
@@ -5359,6 +5394,138 @@
           </p:txBody>
         </p:sp>
       </p:grpSp>
+      <p:sp>
+        <p:nvSpPr>
+          <p:cNvPr id="56" name="Rectangle 55"/>
+          <p:cNvSpPr/>
+          <p:nvPr/>
+        </p:nvSpPr>
+        <p:spPr>
+          <a:xfrm>
+            <a:off x="565786" y="5511474"/>
+            <a:ext cx="1096618" cy="238870"/>
+          </a:xfrm>
+          <a:prstGeom prst="rect">
+            <a:avLst/>
+          </a:prstGeom>
+          <a:solidFill>
+            <a:schemeClr val="bg1"/>
+          </a:solidFill>
+          <a:ln w="12700">
+            <a:solidFill>
+              <a:schemeClr val="tx1"/>
+            </a:solidFill>
+          </a:ln>
+        </p:spPr>
+        <p:style>
+          <a:lnRef idx="2">
+            <a:schemeClr val="accent1">
+              <a:shade val="50000"/>
+            </a:schemeClr>
+          </a:lnRef>
+          <a:fillRef idx="1">
+            <a:schemeClr val="accent1"/>
+          </a:fillRef>
+          <a:effectRef idx="0">
+            <a:schemeClr val="accent1"/>
+          </a:effectRef>
+          <a:fontRef idx="minor">
+            <a:schemeClr val="lt1"/>
+          </a:fontRef>
+        </p:style>
+        <p:txBody>
+          <a:bodyPr rtlCol="0" anchor="ctr"/>
+          <a:lstStyle/>
+          <a:p>
+            <a:pPr algn="ctr"/>
+            <a:r>
+              <a:rPr lang="en-US" sz="1300" smtClean="0">
+                <a:solidFill>
+                  <a:schemeClr val="tx1"/>
+                </a:solidFill>
+                <a:latin typeface="Tahoma" panose="020B0604030504040204" pitchFamily="34" charset="0"/>
+                <a:ea typeface="Tahoma" panose="020B0604030504040204" pitchFamily="34" charset="0"/>
+                <a:cs typeface="Tahoma" panose="020B0604030504040204" pitchFamily="34" charset="0"/>
+              </a:rPr>
+              <a:t>ChungTu</a:t>
+            </a:r>
+            <a:endParaRPr lang="en-US" sz="1300">
+              <a:solidFill>
+                <a:schemeClr val="tx1"/>
+              </a:solidFill>
+              <a:latin typeface="Tahoma" panose="020B0604030504040204" pitchFamily="34" charset="0"/>
+              <a:ea typeface="Tahoma" panose="020B0604030504040204" pitchFamily="34" charset="0"/>
+              <a:cs typeface="Tahoma" panose="020B0604030504040204" pitchFamily="34" charset="0"/>
+            </a:endParaRPr>
+          </a:p>
+        </p:txBody>
+      </p:sp>
+      <p:sp>
+        <p:nvSpPr>
+          <p:cNvPr id="57" name="Rectangle 56"/>
+          <p:cNvSpPr/>
+          <p:nvPr/>
+        </p:nvSpPr>
+        <p:spPr>
+          <a:xfrm>
+            <a:off x="4471642" y="5512519"/>
+            <a:ext cx="1046981" cy="238870"/>
+          </a:xfrm>
+          <a:prstGeom prst="rect">
+            <a:avLst/>
+          </a:prstGeom>
+          <a:solidFill>
+            <a:schemeClr val="bg1"/>
+          </a:solidFill>
+          <a:ln w="12700">
+            <a:solidFill>
+              <a:schemeClr val="tx1"/>
+            </a:solidFill>
+          </a:ln>
+        </p:spPr>
+        <p:style>
+          <a:lnRef idx="2">
+            <a:schemeClr val="accent1">
+              <a:shade val="50000"/>
+            </a:schemeClr>
+          </a:lnRef>
+          <a:fillRef idx="1">
+            <a:schemeClr val="accent1"/>
+          </a:fillRef>
+          <a:effectRef idx="0">
+            <a:schemeClr val="accent1"/>
+          </a:effectRef>
+          <a:fontRef idx="minor">
+            <a:schemeClr val="lt1"/>
+          </a:fontRef>
+        </p:style>
+        <p:txBody>
+          <a:bodyPr rtlCol="0" anchor="ctr"/>
+          <a:lstStyle/>
+          <a:p>
+            <a:pPr algn="ctr"/>
+            <a:r>
+              <a:rPr lang="en-US" sz="1300" smtClean="0">
+                <a:solidFill>
+                  <a:schemeClr val="tx1"/>
+                </a:solidFill>
+                <a:latin typeface="Tahoma" panose="020B0604030504040204" pitchFamily="34" charset="0"/>
+                <a:ea typeface="Tahoma" panose="020B0604030504040204" pitchFamily="34" charset="0"/>
+                <a:cs typeface="Tahoma" panose="020B0604030504040204" pitchFamily="34" charset="0"/>
+              </a:rPr>
+              <a:t>Attachment</a:t>
+            </a:r>
+            <a:endParaRPr lang="en-US" sz="1300">
+              <a:solidFill>
+                <a:schemeClr val="tx1"/>
+              </a:solidFill>
+              <a:latin typeface="Tahoma" panose="020B0604030504040204" pitchFamily="34" charset="0"/>
+              <a:ea typeface="Tahoma" panose="020B0604030504040204" pitchFamily="34" charset="0"/>
+              <a:cs typeface="Tahoma" panose="020B0604030504040204" pitchFamily="34" charset="0"/>
+            </a:endParaRPr>
+          </a:p>
+        </p:txBody>
+      </p:sp>
     </p:spTree>
     <p:extLst>
       <p:ext uri="{BB962C8B-B14F-4D97-AF65-F5344CB8AC3E}">

</xml_diff>